<commit_message>
Creación de la pagina de analisis de temporada, junto a la plantilla, medidas dax y control de imagen para utilizar la url de la API de TMDB.
</commit_message>
<xml_diff>
--- a/serie-naruto-shippuden/plantilla.pptx
+++ b/serie-naruto-shippuden/plantilla.pptx
@@ -104,6 +104,11 @@
       </a:defRPr>
     </a:lvl9pPr>
   </p:defaultTextStyle>
+  <p:extLst>
+    <p:ext uri="{EFAFB233-063F-42B5-8137-9DF3F51BA10A}">
+      <p15:sldGuideLst xmlns:p15="http://schemas.microsoft.com/office/powerpoint/2012/main"/>
+    </p:ext>
+  </p:extLst>
 </p:presentation>
 </file>
 
@@ -256,7 +261,7 @@
           <a:p>
             <a:fld id="{8F9B85BA-CB58-4850-9C01-B97638B0E33F}" type="datetimeFigureOut">
               <a:rPr lang="es-CL" smtClean="0"/>
-              <a:t>23-06-2025</a:t>
+              <a:t>24-06-2025</a:t>
             </a:fld>
             <a:endParaRPr lang="es-CL"/>
           </a:p>
@@ -456,7 +461,7 @@
           <a:p>
             <a:fld id="{8F9B85BA-CB58-4850-9C01-B97638B0E33F}" type="datetimeFigureOut">
               <a:rPr lang="es-CL" smtClean="0"/>
-              <a:t>23-06-2025</a:t>
+              <a:t>24-06-2025</a:t>
             </a:fld>
             <a:endParaRPr lang="es-CL"/>
           </a:p>
@@ -666,7 +671,7 @@
           <a:p>
             <a:fld id="{8F9B85BA-CB58-4850-9C01-B97638B0E33F}" type="datetimeFigureOut">
               <a:rPr lang="es-CL" smtClean="0"/>
-              <a:t>23-06-2025</a:t>
+              <a:t>24-06-2025</a:t>
             </a:fld>
             <a:endParaRPr lang="es-CL"/>
           </a:p>
@@ -866,7 +871,7 @@
           <a:p>
             <a:fld id="{8F9B85BA-CB58-4850-9C01-B97638B0E33F}" type="datetimeFigureOut">
               <a:rPr lang="es-CL" smtClean="0"/>
-              <a:t>23-06-2025</a:t>
+              <a:t>24-06-2025</a:t>
             </a:fld>
             <a:endParaRPr lang="es-CL"/>
           </a:p>
@@ -1142,7 +1147,7 @@
           <a:p>
             <a:fld id="{8F9B85BA-CB58-4850-9C01-B97638B0E33F}" type="datetimeFigureOut">
               <a:rPr lang="es-CL" smtClean="0"/>
-              <a:t>23-06-2025</a:t>
+              <a:t>24-06-2025</a:t>
             </a:fld>
             <a:endParaRPr lang="es-CL"/>
           </a:p>
@@ -1410,7 +1415,7 @@
           <a:p>
             <a:fld id="{8F9B85BA-CB58-4850-9C01-B97638B0E33F}" type="datetimeFigureOut">
               <a:rPr lang="es-CL" smtClean="0"/>
-              <a:t>23-06-2025</a:t>
+              <a:t>24-06-2025</a:t>
             </a:fld>
             <a:endParaRPr lang="es-CL"/>
           </a:p>
@@ -1825,7 +1830,7 @@
           <a:p>
             <a:fld id="{8F9B85BA-CB58-4850-9C01-B97638B0E33F}" type="datetimeFigureOut">
               <a:rPr lang="es-CL" smtClean="0"/>
-              <a:t>23-06-2025</a:t>
+              <a:t>24-06-2025</a:t>
             </a:fld>
             <a:endParaRPr lang="es-CL"/>
           </a:p>
@@ -1967,7 +1972,7 @@
           <a:p>
             <a:fld id="{8F9B85BA-CB58-4850-9C01-B97638B0E33F}" type="datetimeFigureOut">
               <a:rPr lang="es-CL" smtClean="0"/>
-              <a:t>23-06-2025</a:t>
+              <a:t>24-06-2025</a:t>
             </a:fld>
             <a:endParaRPr lang="es-CL"/>
           </a:p>
@@ -2080,7 +2085,7 @@
           <a:p>
             <a:fld id="{8F9B85BA-CB58-4850-9C01-B97638B0E33F}" type="datetimeFigureOut">
               <a:rPr lang="es-CL" smtClean="0"/>
-              <a:t>23-06-2025</a:t>
+              <a:t>24-06-2025</a:t>
             </a:fld>
             <a:endParaRPr lang="es-CL"/>
           </a:p>
@@ -2393,7 +2398,7 @@
           <a:p>
             <a:fld id="{8F9B85BA-CB58-4850-9C01-B97638B0E33F}" type="datetimeFigureOut">
               <a:rPr lang="es-CL" smtClean="0"/>
-              <a:t>23-06-2025</a:t>
+              <a:t>24-06-2025</a:t>
             </a:fld>
             <a:endParaRPr lang="es-CL"/>
           </a:p>
@@ -2682,7 +2687,7 @@
           <a:p>
             <a:fld id="{8F9B85BA-CB58-4850-9C01-B97638B0E33F}" type="datetimeFigureOut">
               <a:rPr lang="es-CL" smtClean="0"/>
-              <a:t>23-06-2025</a:t>
+              <a:t>24-06-2025</a:t>
             </a:fld>
             <a:endParaRPr lang="es-CL"/>
           </a:p>
@@ -2925,7 +2930,7 @@
           <a:p>
             <a:fld id="{8F9B85BA-CB58-4850-9C01-B97638B0E33F}" type="datetimeFigureOut">
               <a:rPr lang="es-CL" smtClean="0"/>
-              <a:t>23-06-2025</a:t>
+              <a:t>24-06-2025</a:t>
             </a:fld>
             <a:endParaRPr lang="es-CL"/>
           </a:p>
@@ -3352,6 +3357,68 @@
       </p:grpSpPr>
       <p:sp>
         <p:nvSpPr>
+          <p:cNvPr id="64" name="Rectángulo 63">
+            <a:extLst>
+              <a:ext uri="{FF2B5EF4-FFF2-40B4-BE49-F238E27FC236}">
+                <a16:creationId xmlns:a16="http://schemas.microsoft.com/office/drawing/2014/main" id="{E328DB7E-171A-4A06-8734-15DEB7D2782A}"/>
+              </a:ext>
+            </a:extLst>
+          </p:cNvPr>
+          <p:cNvSpPr/>
+          <p:nvPr/>
+        </p:nvSpPr>
+        <p:spPr>
+          <a:xfrm>
+            <a:off x="8675255" y="749299"/>
+            <a:ext cx="2552918" cy="591127"/>
+          </a:xfrm>
+          <a:prstGeom prst="rect">
+            <a:avLst/>
+          </a:prstGeom>
+          <a:solidFill>
+            <a:schemeClr val="tx1">
+              <a:lumMod val="65000"/>
+              <a:lumOff val="35000"/>
+            </a:schemeClr>
+          </a:solidFill>
+          <a:ln>
+            <a:noFill/>
+          </a:ln>
+          <a:effectLst>
+            <a:outerShdw blurRad="50800" dist="38100" dir="2700000" algn="tl" rotWithShape="0">
+              <a:prstClr val="black">
+                <a:alpha val="40000"/>
+              </a:prstClr>
+            </a:outerShdw>
+          </a:effectLst>
+        </p:spPr>
+        <p:style>
+          <a:lnRef idx="2">
+            <a:schemeClr val="accent1">
+              <a:shade val="50000"/>
+            </a:schemeClr>
+          </a:lnRef>
+          <a:fillRef idx="1">
+            <a:schemeClr val="accent1"/>
+          </a:fillRef>
+          <a:effectRef idx="0">
+            <a:schemeClr val="accent1"/>
+          </a:effectRef>
+          <a:fontRef idx="minor">
+            <a:schemeClr val="lt1"/>
+          </a:fontRef>
+        </p:style>
+        <p:txBody>
+          <a:bodyPr rtlCol="0" anchor="ctr"/>
+          <a:lstStyle/>
+          <a:p>
+            <a:pPr algn="ctr"/>
+            <a:endParaRPr lang="es-CL"/>
+          </a:p>
+        </p:txBody>
+      </p:sp>
+      <p:sp>
+        <p:nvSpPr>
           <p:cNvPr id="6" name="Rectángulo 5">
             <a:extLst>
               <a:ext uri="{FF2B5EF4-FFF2-40B4-BE49-F238E27FC236}">
@@ -3365,7 +3432,7 @@
         <p:spPr>
           <a:xfrm>
             <a:off x="0" y="-18473"/>
-            <a:ext cx="600364" cy="6876473"/>
+            <a:ext cx="546100" cy="6876473"/>
           </a:xfrm>
           <a:prstGeom prst="rect">
             <a:avLst/>
@@ -3423,8 +3490,8 @@
         </p:nvSpPr>
         <p:spPr>
           <a:xfrm>
-            <a:off x="2669307" y="907472"/>
-            <a:ext cx="4054766" cy="2521528"/>
+            <a:off x="2520369" y="2220190"/>
+            <a:ext cx="4054766" cy="2107336"/>
           </a:xfrm>
           <a:prstGeom prst="rect">
             <a:avLst/>
@@ -3484,8 +3551,8 @@
         </p:nvSpPr>
         <p:spPr>
           <a:xfrm>
-            <a:off x="858981" y="907472"/>
-            <a:ext cx="1662545" cy="2521528"/>
+            <a:off x="931720" y="2220189"/>
+            <a:ext cx="1440868" cy="2107337"/>
           </a:xfrm>
           <a:prstGeom prst="rect">
             <a:avLst/>
@@ -3543,8 +3610,8 @@
         </p:nvSpPr>
         <p:spPr>
           <a:xfrm>
-            <a:off x="6871854" y="907472"/>
-            <a:ext cx="2382983" cy="2521528"/>
+            <a:off x="6722916" y="2220190"/>
+            <a:ext cx="2382983" cy="2107336"/>
           </a:xfrm>
           <a:prstGeom prst="rect">
             <a:avLst/>
@@ -3592,55 +3659,720 @@
       </p:sp>
       <p:sp>
         <p:nvSpPr>
-          <p:cNvPr id="27" name="CuadroTexto 26">
-            <a:extLst>
-              <a:ext uri="{FF2B5EF4-FFF2-40B4-BE49-F238E27FC236}">
-                <a16:creationId xmlns:a16="http://schemas.microsoft.com/office/drawing/2014/main" id="{26E16552-11BC-4F56-A27E-590D17126908}"/>
-              </a:ext>
-            </a:extLst>
-          </p:cNvPr>
-          <p:cNvSpPr txBox="1"/>
+          <p:cNvPr id="15" name="Rectángulo 14">
+            <a:extLst>
+              <a:ext uri="{FF2B5EF4-FFF2-40B4-BE49-F238E27FC236}">
+                <a16:creationId xmlns:a16="http://schemas.microsoft.com/office/drawing/2014/main" id="{AE816048-31DA-49AE-8F3C-515C665583E6}"/>
+              </a:ext>
+            </a:extLst>
+          </p:cNvPr>
+          <p:cNvSpPr/>
           <p:nvPr/>
         </p:nvSpPr>
         <p:spPr>
           <a:xfrm>
-            <a:off x="6871854" y="977844"/>
-            <a:ext cx="2382983" cy="261610"/>
+            <a:off x="931720" y="1541313"/>
+            <a:ext cx="886689" cy="553029"/>
           </a:xfrm>
           <a:prstGeom prst="rect">
             <a:avLst/>
           </a:prstGeom>
           <a:solidFill>
-            <a:schemeClr val="bg1">
-              <a:alpha val="0"/>
+            <a:srgbClr val="474650">
+              <a:alpha val="70000"/>
+            </a:srgbClr>
+          </a:solidFill>
+          <a:ln>
+            <a:noFill/>
+          </a:ln>
+          <a:effectLst>
+            <a:outerShdw blurRad="63500" sx="102000" sy="102000" algn="ctr" rotWithShape="0">
+              <a:prstClr val="black">
+                <a:alpha val="40000"/>
+              </a:prstClr>
+            </a:outerShdw>
+          </a:effectLst>
+        </p:spPr>
+        <p:style>
+          <a:lnRef idx="2">
+            <a:schemeClr val="accent1">
+              <a:shade val="50000"/>
+            </a:schemeClr>
+          </a:lnRef>
+          <a:fillRef idx="1">
+            <a:schemeClr val="accent1"/>
+          </a:fillRef>
+          <a:effectRef idx="0">
+            <a:schemeClr val="accent1"/>
+          </a:effectRef>
+          <a:fontRef idx="minor">
+            <a:schemeClr val="lt1"/>
+          </a:fontRef>
+        </p:style>
+        <p:txBody>
+          <a:bodyPr rtlCol="0" anchor="ctr"/>
+          <a:lstStyle/>
+          <a:p>
+            <a:pPr algn="ctr"/>
+            <a:endParaRPr lang="es-CL"/>
+          </a:p>
+        </p:txBody>
+      </p:sp>
+      <p:sp>
+        <p:nvSpPr>
+          <p:cNvPr id="20" name="Rectángulo 19">
+            <a:extLst>
+              <a:ext uri="{FF2B5EF4-FFF2-40B4-BE49-F238E27FC236}">
+                <a16:creationId xmlns:a16="http://schemas.microsoft.com/office/drawing/2014/main" id="{0C4044E1-7287-4BC9-8324-2FB28445D2FF}"/>
+              </a:ext>
+            </a:extLst>
+          </p:cNvPr>
+          <p:cNvSpPr/>
+          <p:nvPr/>
+        </p:nvSpPr>
+        <p:spPr>
+          <a:xfrm>
+            <a:off x="1909613" y="1541313"/>
+            <a:ext cx="1394692" cy="553029"/>
+          </a:xfrm>
+          <a:prstGeom prst="rect">
+            <a:avLst/>
+          </a:prstGeom>
+          <a:solidFill>
+            <a:srgbClr val="474650">
+              <a:alpha val="70000"/>
+            </a:srgbClr>
+          </a:solidFill>
+          <a:ln>
+            <a:noFill/>
+          </a:ln>
+          <a:effectLst>
+            <a:outerShdw blurRad="63500" sx="102000" sy="102000" algn="ctr" rotWithShape="0">
+              <a:prstClr val="black">
+                <a:alpha val="40000"/>
+              </a:prstClr>
+            </a:outerShdw>
+          </a:effectLst>
+        </p:spPr>
+        <p:style>
+          <a:lnRef idx="2">
+            <a:schemeClr val="accent1">
+              <a:shade val="50000"/>
+            </a:schemeClr>
+          </a:lnRef>
+          <a:fillRef idx="1">
+            <a:schemeClr val="accent1"/>
+          </a:fillRef>
+          <a:effectRef idx="0">
+            <a:schemeClr val="accent1"/>
+          </a:effectRef>
+          <a:fontRef idx="minor">
+            <a:schemeClr val="lt1"/>
+          </a:fontRef>
+        </p:style>
+        <p:txBody>
+          <a:bodyPr rtlCol="0" anchor="ctr"/>
+          <a:lstStyle/>
+          <a:p>
+            <a:pPr algn="ctr"/>
+            <a:endParaRPr lang="es-CL"/>
+          </a:p>
+        </p:txBody>
+      </p:sp>
+      <p:sp>
+        <p:nvSpPr>
+          <p:cNvPr id="22" name="Rectángulo 21">
+            <a:extLst>
+              <a:ext uri="{FF2B5EF4-FFF2-40B4-BE49-F238E27FC236}">
+                <a16:creationId xmlns:a16="http://schemas.microsoft.com/office/drawing/2014/main" id="{A0EC68FD-2A6A-4C45-8D76-6431BA848441}"/>
+              </a:ext>
+            </a:extLst>
+          </p:cNvPr>
+          <p:cNvSpPr/>
+          <p:nvPr/>
+        </p:nvSpPr>
+        <p:spPr>
+          <a:xfrm>
+            <a:off x="3366065" y="1541313"/>
+            <a:ext cx="997528" cy="553029"/>
+          </a:xfrm>
+          <a:prstGeom prst="rect">
+            <a:avLst/>
+          </a:prstGeom>
+          <a:solidFill>
+            <a:srgbClr val="474650">
+              <a:alpha val="70000"/>
+            </a:srgbClr>
+          </a:solidFill>
+          <a:ln>
+            <a:noFill/>
+          </a:ln>
+          <a:effectLst>
+            <a:outerShdw blurRad="63500" sx="102000" sy="102000" algn="ctr" rotWithShape="0">
+              <a:prstClr val="black">
+                <a:alpha val="40000"/>
+              </a:prstClr>
+            </a:outerShdw>
+          </a:effectLst>
+        </p:spPr>
+        <p:style>
+          <a:lnRef idx="2">
+            <a:schemeClr val="accent1">
+              <a:shade val="50000"/>
+            </a:schemeClr>
+          </a:lnRef>
+          <a:fillRef idx="1">
+            <a:schemeClr val="accent1"/>
+          </a:fillRef>
+          <a:effectRef idx="0">
+            <a:schemeClr val="accent1"/>
+          </a:effectRef>
+          <a:fontRef idx="minor">
+            <a:schemeClr val="lt1"/>
+          </a:fontRef>
+        </p:style>
+        <p:txBody>
+          <a:bodyPr rtlCol="0" anchor="ctr"/>
+          <a:lstStyle/>
+          <a:p>
+            <a:pPr algn="ctr"/>
+            <a:endParaRPr lang="es-CL"/>
+          </a:p>
+        </p:txBody>
+      </p:sp>
+      <p:sp>
+        <p:nvSpPr>
+          <p:cNvPr id="23" name="Rectángulo 22">
+            <a:extLst>
+              <a:ext uri="{FF2B5EF4-FFF2-40B4-BE49-F238E27FC236}">
+                <a16:creationId xmlns:a16="http://schemas.microsoft.com/office/drawing/2014/main" id="{01E68EE3-8AD3-4ED8-9A99-173AAFCE0F2C}"/>
+              </a:ext>
+            </a:extLst>
+          </p:cNvPr>
+          <p:cNvSpPr/>
+          <p:nvPr/>
+        </p:nvSpPr>
+        <p:spPr>
+          <a:xfrm>
+            <a:off x="4425353" y="1541313"/>
+            <a:ext cx="997528" cy="553029"/>
+          </a:xfrm>
+          <a:prstGeom prst="rect">
+            <a:avLst/>
+          </a:prstGeom>
+          <a:solidFill>
+            <a:srgbClr val="474650">
+              <a:alpha val="70000"/>
+            </a:srgbClr>
+          </a:solidFill>
+          <a:ln>
+            <a:noFill/>
+          </a:ln>
+          <a:effectLst>
+            <a:outerShdw blurRad="63500" sx="102000" sy="102000" algn="ctr" rotWithShape="0">
+              <a:prstClr val="black">
+                <a:alpha val="40000"/>
+              </a:prstClr>
+            </a:outerShdw>
+          </a:effectLst>
+        </p:spPr>
+        <p:style>
+          <a:lnRef idx="2">
+            <a:schemeClr val="accent1">
+              <a:shade val="50000"/>
+            </a:schemeClr>
+          </a:lnRef>
+          <a:fillRef idx="1">
+            <a:schemeClr val="accent1"/>
+          </a:fillRef>
+          <a:effectRef idx="0">
+            <a:schemeClr val="accent1"/>
+          </a:effectRef>
+          <a:fontRef idx="minor">
+            <a:schemeClr val="lt1"/>
+          </a:fontRef>
+        </p:style>
+        <p:txBody>
+          <a:bodyPr rtlCol="0" anchor="ctr"/>
+          <a:lstStyle/>
+          <a:p>
+            <a:pPr algn="ctr"/>
+            <a:endParaRPr lang="es-CL"/>
+          </a:p>
+        </p:txBody>
+      </p:sp>
+      <p:sp>
+        <p:nvSpPr>
+          <p:cNvPr id="30" name="Rectángulo 29">
+            <a:extLst>
+              <a:ext uri="{FF2B5EF4-FFF2-40B4-BE49-F238E27FC236}">
+                <a16:creationId xmlns:a16="http://schemas.microsoft.com/office/drawing/2014/main" id="{50CE7AF2-A890-422F-8D05-F016381CDA47}"/>
+              </a:ext>
+            </a:extLst>
+          </p:cNvPr>
+          <p:cNvSpPr/>
+          <p:nvPr/>
+        </p:nvSpPr>
+        <p:spPr>
+          <a:xfrm>
+            <a:off x="9253680" y="2220190"/>
+            <a:ext cx="2627458" cy="4488586"/>
+          </a:xfrm>
+          <a:prstGeom prst="rect">
+            <a:avLst/>
+          </a:prstGeom>
+          <a:solidFill>
+            <a:srgbClr val="474650">
+              <a:alpha val="70000"/>
+            </a:srgbClr>
+          </a:solidFill>
+          <a:ln>
+            <a:noFill/>
+          </a:ln>
+          <a:effectLst>
+            <a:outerShdw blurRad="63500" sx="102000" sy="102000" algn="ctr" rotWithShape="0">
+              <a:prstClr val="black">
+                <a:alpha val="40000"/>
+              </a:prstClr>
+            </a:outerShdw>
+          </a:effectLst>
+        </p:spPr>
+        <p:style>
+          <a:lnRef idx="2">
+            <a:schemeClr val="accent1">
+              <a:shade val="50000"/>
+            </a:schemeClr>
+          </a:lnRef>
+          <a:fillRef idx="1">
+            <a:schemeClr val="accent1"/>
+          </a:fillRef>
+          <a:effectRef idx="0">
+            <a:schemeClr val="accent1"/>
+          </a:effectRef>
+          <a:fontRef idx="minor">
+            <a:schemeClr val="lt1"/>
+          </a:fontRef>
+        </p:style>
+        <p:txBody>
+          <a:bodyPr rtlCol="0" anchor="ctr"/>
+          <a:lstStyle/>
+          <a:p>
+            <a:pPr algn="ctr"/>
+            <a:endParaRPr lang="es-CL"/>
+          </a:p>
+        </p:txBody>
+      </p:sp>
+      <p:sp>
+        <p:nvSpPr>
+          <p:cNvPr id="34" name="Rectángulo 33">
+            <a:extLst>
+              <a:ext uri="{FF2B5EF4-FFF2-40B4-BE49-F238E27FC236}">
+                <a16:creationId xmlns:a16="http://schemas.microsoft.com/office/drawing/2014/main" id="{D761F7D6-5851-4F9E-9138-C841BD2D00DE}"/>
+              </a:ext>
+            </a:extLst>
+          </p:cNvPr>
+          <p:cNvSpPr/>
+          <p:nvPr/>
+        </p:nvSpPr>
+        <p:spPr>
+          <a:xfrm>
+            <a:off x="931720" y="4477615"/>
+            <a:ext cx="4867562" cy="2231161"/>
+          </a:xfrm>
+          <a:prstGeom prst="rect">
+            <a:avLst/>
+          </a:prstGeom>
+          <a:solidFill>
+            <a:srgbClr val="474650">
+              <a:alpha val="70000"/>
+            </a:srgbClr>
+          </a:solidFill>
+          <a:ln>
+            <a:noFill/>
+          </a:ln>
+          <a:effectLst>
+            <a:outerShdw blurRad="63500" sx="102000" sy="102000" algn="ctr" rotWithShape="0">
+              <a:prstClr val="black">
+                <a:alpha val="40000"/>
+              </a:prstClr>
+            </a:outerShdw>
+          </a:effectLst>
+        </p:spPr>
+        <p:style>
+          <a:lnRef idx="2">
+            <a:schemeClr val="accent1">
+              <a:shade val="50000"/>
+            </a:schemeClr>
+          </a:lnRef>
+          <a:fillRef idx="1">
+            <a:schemeClr val="accent1"/>
+          </a:fillRef>
+          <a:effectRef idx="0">
+            <a:schemeClr val="accent1"/>
+          </a:effectRef>
+          <a:fontRef idx="minor">
+            <a:schemeClr val="lt1"/>
+          </a:fontRef>
+        </p:style>
+        <p:txBody>
+          <a:bodyPr rtlCol="0" anchor="ctr"/>
+          <a:lstStyle/>
+          <a:p>
+            <a:pPr algn="ctr"/>
+            <a:endParaRPr lang="es-CL"/>
+          </a:p>
+        </p:txBody>
+      </p:sp>
+      <p:sp>
+        <p:nvSpPr>
+          <p:cNvPr id="36" name="Rectángulo 35">
+            <a:extLst>
+              <a:ext uri="{FF2B5EF4-FFF2-40B4-BE49-F238E27FC236}">
+                <a16:creationId xmlns:a16="http://schemas.microsoft.com/office/drawing/2014/main" id="{F373AE56-1EA2-42CC-9B7F-F072CC4C649E}"/>
+              </a:ext>
+            </a:extLst>
+          </p:cNvPr>
+          <p:cNvSpPr/>
+          <p:nvPr/>
+        </p:nvSpPr>
+        <p:spPr>
+          <a:xfrm>
+            <a:off x="5947063" y="4477615"/>
+            <a:ext cx="3158836" cy="2231161"/>
+          </a:xfrm>
+          <a:prstGeom prst="rect">
+            <a:avLst/>
+          </a:prstGeom>
+          <a:solidFill>
+            <a:srgbClr val="474650">
+              <a:alpha val="70000"/>
+            </a:srgbClr>
+          </a:solidFill>
+          <a:ln>
+            <a:noFill/>
+          </a:ln>
+          <a:effectLst>
+            <a:outerShdw blurRad="63500" sx="102000" sy="102000" algn="ctr" rotWithShape="0">
+              <a:prstClr val="black">
+                <a:alpha val="40000"/>
+              </a:prstClr>
+            </a:outerShdw>
+          </a:effectLst>
+        </p:spPr>
+        <p:style>
+          <a:lnRef idx="2">
+            <a:schemeClr val="accent1">
+              <a:shade val="50000"/>
+            </a:schemeClr>
+          </a:lnRef>
+          <a:fillRef idx="1">
+            <a:schemeClr val="accent1"/>
+          </a:fillRef>
+          <a:effectRef idx="0">
+            <a:schemeClr val="accent1"/>
+          </a:effectRef>
+          <a:fontRef idx="minor">
+            <a:schemeClr val="lt1"/>
+          </a:fontRef>
+        </p:style>
+        <p:txBody>
+          <a:bodyPr rtlCol="0" anchor="ctr"/>
+          <a:lstStyle/>
+          <a:p>
+            <a:pPr algn="ctr"/>
+            <a:endParaRPr lang="es-CL"/>
+          </a:p>
+        </p:txBody>
+      </p:sp>
+      <p:sp>
+        <p:nvSpPr>
+          <p:cNvPr id="40" name="Rectángulo 39">
+            <a:extLst>
+              <a:ext uri="{FF2B5EF4-FFF2-40B4-BE49-F238E27FC236}">
+                <a16:creationId xmlns:a16="http://schemas.microsoft.com/office/drawing/2014/main" id="{15241EAA-A01E-497D-B748-75516DABB9B2}"/>
+              </a:ext>
+            </a:extLst>
+          </p:cNvPr>
+          <p:cNvSpPr/>
+          <p:nvPr/>
+        </p:nvSpPr>
+        <p:spPr>
+          <a:xfrm>
+            <a:off x="931720" y="749299"/>
+            <a:ext cx="5015344" cy="591127"/>
+          </a:xfrm>
+          <a:prstGeom prst="rect">
+            <a:avLst/>
+          </a:prstGeom>
+          <a:solidFill>
+            <a:schemeClr val="tx1">
+              <a:lumMod val="65000"/>
+              <a:lumOff val="35000"/>
             </a:schemeClr>
           </a:solidFill>
+          <a:ln>
+            <a:noFill/>
+          </a:ln>
+          <a:effectLst>
+            <a:outerShdw blurRad="50800" dist="38100" dir="2700000" algn="tl" rotWithShape="0">
+              <a:prstClr val="black">
+                <a:alpha val="40000"/>
+              </a:prstClr>
+            </a:outerShdw>
+          </a:effectLst>
         </p:spPr>
-        <p:txBody>
-          <a:bodyPr wrap="square" rtlCol="0">
-            <a:spAutoFit/>
-          </a:bodyPr>
+        <p:style>
+          <a:lnRef idx="2">
+            <a:schemeClr val="accent1">
+              <a:shade val="50000"/>
+            </a:schemeClr>
+          </a:lnRef>
+          <a:fillRef idx="1">
+            <a:schemeClr val="accent1"/>
+          </a:fillRef>
+          <a:effectRef idx="0">
+            <a:schemeClr val="accent1"/>
+          </a:effectRef>
+          <a:fontRef idx="minor">
+            <a:schemeClr val="lt1"/>
+          </a:fontRef>
+        </p:style>
+        <p:txBody>
+          <a:bodyPr rtlCol="0" anchor="ctr"/>
           <a:lstStyle/>
           <a:p>
             <a:pPr algn="ctr"/>
-            <a:r>
-              <a:rPr lang="es-CL" sz="1100" dirty="0">
-                <a:solidFill>
-                  <a:schemeClr val="bg1"/>
-                </a:solidFill>
-                <a:latin typeface="Arial Narrow" panose="020B0606020202030204" pitchFamily="34" charset="0"/>
-              </a:rPr>
-              <a:t>TIPO DE CAPÍTULOS</a:t>
-            </a:r>
+            <a:endParaRPr lang="es-CL"/>
+          </a:p>
+        </p:txBody>
+      </p:sp>
+      <p:sp>
+        <p:nvSpPr>
+          <p:cNvPr id="12" name="Rectángulo 11">
+            <a:extLst>
+              <a:ext uri="{FF2B5EF4-FFF2-40B4-BE49-F238E27FC236}">
+                <a16:creationId xmlns:a16="http://schemas.microsoft.com/office/drawing/2014/main" id="{5CD192FA-D485-44E6-9C81-DF4B8F139560}"/>
+              </a:ext>
+            </a:extLst>
+          </p:cNvPr>
+          <p:cNvSpPr/>
+          <p:nvPr/>
+        </p:nvSpPr>
+        <p:spPr>
+          <a:xfrm>
+            <a:off x="931721" y="749299"/>
+            <a:ext cx="397161" cy="591127"/>
+          </a:xfrm>
+          <a:prstGeom prst="rect">
+            <a:avLst/>
+          </a:prstGeom>
+          <a:solidFill>
+            <a:srgbClr val="474650"/>
+          </a:solidFill>
+          <a:ln>
+            <a:noFill/>
+          </a:ln>
+          <a:effectLst/>
+        </p:spPr>
+        <p:style>
+          <a:lnRef idx="2">
+            <a:schemeClr val="accent1">
+              <a:shade val="50000"/>
+            </a:schemeClr>
+          </a:lnRef>
+          <a:fillRef idx="1">
+            <a:schemeClr val="accent1"/>
+          </a:fillRef>
+          <a:effectRef idx="0">
+            <a:schemeClr val="accent1"/>
+          </a:effectRef>
+          <a:fontRef idx="minor">
+            <a:schemeClr val="lt1"/>
+          </a:fontRef>
+        </p:style>
+        <p:txBody>
+          <a:bodyPr rtlCol="0" anchor="ctr"/>
+          <a:lstStyle/>
+          <a:p>
+            <a:pPr algn="ctr"/>
+            <a:endParaRPr lang="es-CL"/>
+          </a:p>
+        </p:txBody>
+      </p:sp>
+      <p:sp>
+        <p:nvSpPr>
+          <p:cNvPr id="44" name="Rectángulo 43">
+            <a:extLst>
+              <a:ext uri="{FF2B5EF4-FFF2-40B4-BE49-F238E27FC236}">
+                <a16:creationId xmlns:a16="http://schemas.microsoft.com/office/drawing/2014/main" id="{F769EBAF-6BF2-4A51-AAF2-A75953E005A1}"/>
+              </a:ext>
+            </a:extLst>
+          </p:cNvPr>
+          <p:cNvSpPr/>
+          <p:nvPr/>
+        </p:nvSpPr>
+        <p:spPr>
+          <a:xfrm>
+            <a:off x="6164119" y="749299"/>
+            <a:ext cx="2294081" cy="591127"/>
+          </a:xfrm>
+          <a:prstGeom prst="rect">
+            <a:avLst/>
+          </a:prstGeom>
+          <a:solidFill>
+            <a:schemeClr val="tx1">
+              <a:lumMod val="65000"/>
+              <a:lumOff val="35000"/>
+            </a:schemeClr>
+          </a:solidFill>
+          <a:ln>
+            <a:noFill/>
+          </a:ln>
+          <a:effectLst>
+            <a:outerShdw blurRad="50800" dist="38100" dir="2700000" algn="tl" rotWithShape="0">
+              <a:prstClr val="black">
+                <a:alpha val="40000"/>
+              </a:prstClr>
+            </a:outerShdw>
+          </a:effectLst>
+        </p:spPr>
+        <p:style>
+          <a:lnRef idx="2">
+            <a:schemeClr val="accent1">
+              <a:shade val="50000"/>
+            </a:schemeClr>
+          </a:lnRef>
+          <a:fillRef idx="1">
+            <a:schemeClr val="accent1"/>
+          </a:fillRef>
+          <a:effectRef idx="0">
+            <a:schemeClr val="accent1"/>
+          </a:effectRef>
+          <a:fontRef idx="minor">
+            <a:schemeClr val="lt1"/>
+          </a:fontRef>
+        </p:style>
+        <p:txBody>
+          <a:bodyPr rtlCol="0" anchor="ctr"/>
+          <a:lstStyle/>
+          <a:p>
+            <a:pPr algn="ctr"/>
+            <a:endParaRPr lang="es-CL"/>
+          </a:p>
+        </p:txBody>
+      </p:sp>
+      <p:sp>
+        <p:nvSpPr>
+          <p:cNvPr id="45" name="Rectángulo 44">
+            <a:extLst>
+              <a:ext uri="{FF2B5EF4-FFF2-40B4-BE49-F238E27FC236}">
+                <a16:creationId xmlns:a16="http://schemas.microsoft.com/office/drawing/2014/main" id="{EB1C862D-0C23-42BC-86C8-1EA36A008BBE}"/>
+              </a:ext>
+            </a:extLst>
+          </p:cNvPr>
+          <p:cNvSpPr/>
+          <p:nvPr/>
+        </p:nvSpPr>
+        <p:spPr>
+          <a:xfrm>
+            <a:off x="6164121" y="749299"/>
+            <a:ext cx="397161" cy="591127"/>
+          </a:xfrm>
+          <a:prstGeom prst="rect">
+            <a:avLst/>
+          </a:prstGeom>
+          <a:solidFill>
+            <a:srgbClr val="474650"/>
+          </a:solidFill>
+          <a:ln>
+            <a:noFill/>
+          </a:ln>
+          <a:effectLst/>
+        </p:spPr>
+        <p:style>
+          <a:lnRef idx="2">
+            <a:schemeClr val="accent1">
+              <a:shade val="50000"/>
+            </a:schemeClr>
+          </a:lnRef>
+          <a:fillRef idx="1">
+            <a:schemeClr val="accent1"/>
+          </a:fillRef>
+          <a:effectRef idx="0">
+            <a:schemeClr val="accent1"/>
+          </a:effectRef>
+          <a:fontRef idx="minor">
+            <a:schemeClr val="lt1"/>
+          </a:fontRef>
+        </p:style>
+        <p:txBody>
+          <a:bodyPr rtlCol="0" anchor="ctr"/>
+          <a:lstStyle/>
+          <a:p>
+            <a:pPr algn="ctr"/>
+            <a:endParaRPr lang="es-CL"/>
+          </a:p>
+        </p:txBody>
+      </p:sp>
+      <p:sp>
+        <p:nvSpPr>
+          <p:cNvPr id="48" name="Rectángulo 47">
+            <a:extLst>
+              <a:ext uri="{FF2B5EF4-FFF2-40B4-BE49-F238E27FC236}">
+                <a16:creationId xmlns:a16="http://schemas.microsoft.com/office/drawing/2014/main" id="{58DE250A-CD84-48E9-A7D6-8079FCCF1613}"/>
+              </a:ext>
+            </a:extLst>
+          </p:cNvPr>
+          <p:cNvSpPr/>
+          <p:nvPr/>
+        </p:nvSpPr>
+        <p:spPr>
+          <a:xfrm>
+            <a:off x="8638131" y="749299"/>
+            <a:ext cx="397161" cy="591127"/>
+          </a:xfrm>
+          <a:prstGeom prst="rect">
+            <a:avLst/>
+          </a:prstGeom>
+          <a:solidFill>
+            <a:srgbClr val="474650"/>
+          </a:solidFill>
+          <a:ln>
+            <a:noFill/>
+          </a:ln>
+          <a:effectLst/>
+        </p:spPr>
+        <p:style>
+          <a:lnRef idx="2">
+            <a:schemeClr val="accent1">
+              <a:shade val="50000"/>
+            </a:schemeClr>
+          </a:lnRef>
+          <a:fillRef idx="1">
+            <a:schemeClr val="accent1"/>
+          </a:fillRef>
+          <a:effectRef idx="0">
+            <a:schemeClr val="accent1"/>
+          </a:effectRef>
+          <a:fontRef idx="minor">
+            <a:schemeClr val="lt1"/>
+          </a:fontRef>
+        </p:style>
+        <p:txBody>
+          <a:bodyPr rtlCol="0" anchor="ctr"/>
+          <a:lstStyle/>
+          <a:p>
+            <a:pPr algn="ctr"/>
+            <a:endParaRPr lang="es-CL"/>
           </a:p>
         </p:txBody>
       </p:sp>
       <p:pic>
         <p:nvPicPr>
-          <p:cNvPr id="29" name="Imagen 28">
-            <a:extLst>
-              <a:ext uri="{FF2B5EF4-FFF2-40B4-BE49-F238E27FC236}">
-                <a16:creationId xmlns:a16="http://schemas.microsoft.com/office/drawing/2014/main" id="{CE63BA0D-126A-4308-BBD4-832F74DAD84D}"/>
+          <p:cNvPr id="59" name="Imagen 58">
+            <a:extLst>
+              <a:ext uri="{FF2B5EF4-FFF2-40B4-BE49-F238E27FC236}">
+                <a16:creationId xmlns:a16="http://schemas.microsoft.com/office/drawing/2014/main" id="{111E2DAF-36A5-40B9-BFC3-84B4ECD73A73}"/>
               </a:ext>
             </a:extLst>
           </p:cNvPr>
@@ -3663,14 +4395,267 @@
         </p:blipFill>
         <p:spPr>
           <a:xfrm>
-            <a:off x="7199850" y="1003677"/>
-            <a:ext cx="209943" cy="209943"/>
+            <a:off x="963827" y="867097"/>
+            <a:ext cx="322911" cy="322911"/>
           </a:xfrm>
           <a:prstGeom prst="rect">
             <a:avLst/>
           </a:prstGeom>
         </p:spPr>
       </p:pic>
+      <p:pic>
+        <p:nvPicPr>
+          <p:cNvPr id="60" name="Imagen 59">
+            <a:extLst>
+              <a:ext uri="{FF2B5EF4-FFF2-40B4-BE49-F238E27FC236}">
+                <a16:creationId xmlns:a16="http://schemas.microsoft.com/office/drawing/2014/main" id="{9E18F306-7447-4B6D-8472-3E67909BB115}"/>
+              </a:ext>
+            </a:extLst>
+          </p:cNvPr>
+          <p:cNvPicPr>
+            <a:picLocks noChangeAspect="1"/>
+          </p:cNvPicPr>
+          <p:nvPr/>
+        </p:nvPicPr>
+        <p:blipFill>
+          <a:blip r:embed="rId3">
+            <a:extLst>
+              <a:ext uri="{28A0092B-C50C-407E-A947-70E740481C1C}">
+                <a14:useLocalDpi xmlns:a14="http://schemas.microsoft.com/office/drawing/2010/main" val="0"/>
+              </a:ext>
+            </a:extLst>
+          </a:blip>
+          <a:srcRect/>
+          <a:stretch/>
+        </p:blipFill>
+        <p:spPr>
+          <a:xfrm>
+            <a:off x="8675255" y="867096"/>
+            <a:ext cx="322911" cy="322911"/>
+          </a:xfrm>
+          <a:prstGeom prst="rect">
+            <a:avLst/>
+          </a:prstGeom>
+        </p:spPr>
+      </p:pic>
+      <p:pic>
+        <p:nvPicPr>
+          <p:cNvPr id="61" name="Imagen 60">
+            <a:extLst>
+              <a:ext uri="{FF2B5EF4-FFF2-40B4-BE49-F238E27FC236}">
+                <a16:creationId xmlns:a16="http://schemas.microsoft.com/office/drawing/2014/main" id="{7873F218-7DF9-4023-8079-8806450EC484}"/>
+              </a:ext>
+            </a:extLst>
+          </p:cNvPr>
+          <p:cNvPicPr>
+            <a:picLocks noChangeAspect="1"/>
+          </p:cNvPicPr>
+          <p:nvPr/>
+        </p:nvPicPr>
+        <p:blipFill>
+          <a:blip r:embed="rId4">
+            <a:extLst>
+              <a:ext uri="{28A0092B-C50C-407E-A947-70E740481C1C}">
+                <a14:useLocalDpi xmlns:a14="http://schemas.microsoft.com/office/drawing/2010/main" val="0"/>
+              </a:ext>
+            </a:extLst>
+          </a:blip>
+          <a:srcRect/>
+          <a:stretch/>
+        </p:blipFill>
+        <p:spPr>
+          <a:xfrm>
+            <a:off x="6201245" y="864458"/>
+            <a:ext cx="322911" cy="322911"/>
+          </a:xfrm>
+          <a:prstGeom prst="rect">
+            <a:avLst/>
+          </a:prstGeom>
+        </p:spPr>
+      </p:pic>
+      <p:sp>
+        <p:nvSpPr>
+          <p:cNvPr id="67" name="Rectángulo 66">
+            <a:extLst>
+              <a:ext uri="{FF2B5EF4-FFF2-40B4-BE49-F238E27FC236}">
+                <a16:creationId xmlns:a16="http://schemas.microsoft.com/office/drawing/2014/main" id="{B25E3CBA-BCA0-4997-8D62-4BEC6DB29DEA}"/>
+              </a:ext>
+            </a:extLst>
+          </p:cNvPr>
+          <p:cNvSpPr/>
+          <p:nvPr/>
+        </p:nvSpPr>
+        <p:spPr>
+          <a:xfrm>
+            <a:off x="9253678" y="2220189"/>
+            <a:ext cx="2627459" cy="322986"/>
+          </a:xfrm>
+          <a:prstGeom prst="rect">
+            <a:avLst/>
+          </a:prstGeom>
+          <a:solidFill>
+            <a:srgbClr val="474650">
+              <a:alpha val="70000"/>
+            </a:srgbClr>
+          </a:solidFill>
+          <a:ln>
+            <a:noFill/>
+          </a:ln>
+          <a:effectLst>
+            <a:outerShdw blurRad="50800" dist="38100" dir="5400000" algn="t" rotWithShape="0">
+              <a:prstClr val="black">
+                <a:alpha val="40000"/>
+              </a:prstClr>
+            </a:outerShdw>
+          </a:effectLst>
+        </p:spPr>
+        <p:style>
+          <a:lnRef idx="2">
+            <a:schemeClr val="accent1">
+              <a:shade val="50000"/>
+            </a:schemeClr>
+          </a:lnRef>
+          <a:fillRef idx="1">
+            <a:schemeClr val="accent1"/>
+          </a:fillRef>
+          <a:effectRef idx="0">
+            <a:schemeClr val="accent1"/>
+          </a:effectRef>
+          <a:fontRef idx="minor">
+            <a:schemeClr val="lt1"/>
+          </a:fontRef>
+        </p:style>
+        <p:txBody>
+          <a:bodyPr rtlCol="0" anchor="ctr"/>
+          <a:lstStyle/>
+          <a:p>
+            <a:pPr algn="ctr"/>
+            <a:endParaRPr lang="es-CL"/>
+          </a:p>
+        </p:txBody>
+      </p:sp>
+      <p:sp>
+        <p:nvSpPr>
+          <p:cNvPr id="69" name="Rectángulo 68">
+            <a:extLst>
+              <a:ext uri="{FF2B5EF4-FFF2-40B4-BE49-F238E27FC236}">
+                <a16:creationId xmlns:a16="http://schemas.microsoft.com/office/drawing/2014/main" id="{8957FBF5-2348-4240-BF4A-AC4960552151}"/>
+              </a:ext>
+            </a:extLst>
+          </p:cNvPr>
+          <p:cNvSpPr/>
+          <p:nvPr/>
+        </p:nvSpPr>
+        <p:spPr>
+          <a:xfrm>
+            <a:off x="6722915" y="2220189"/>
+            <a:ext cx="2382984" cy="322986"/>
+          </a:xfrm>
+          <a:prstGeom prst="rect">
+            <a:avLst/>
+          </a:prstGeom>
+          <a:solidFill>
+            <a:srgbClr val="474650">
+              <a:alpha val="70000"/>
+            </a:srgbClr>
+          </a:solidFill>
+          <a:ln>
+            <a:noFill/>
+          </a:ln>
+          <a:effectLst>
+            <a:outerShdw blurRad="50800" dist="38100" dir="5400000" algn="t" rotWithShape="0">
+              <a:prstClr val="black">
+                <a:alpha val="40000"/>
+              </a:prstClr>
+            </a:outerShdw>
+          </a:effectLst>
+        </p:spPr>
+        <p:style>
+          <a:lnRef idx="2">
+            <a:schemeClr val="accent1">
+              <a:shade val="50000"/>
+            </a:schemeClr>
+          </a:lnRef>
+          <a:fillRef idx="1">
+            <a:schemeClr val="accent1"/>
+          </a:fillRef>
+          <a:effectRef idx="0">
+            <a:schemeClr val="accent1"/>
+          </a:effectRef>
+          <a:fontRef idx="minor">
+            <a:schemeClr val="lt1"/>
+          </a:fontRef>
+        </p:style>
+        <p:txBody>
+          <a:bodyPr rtlCol="0" anchor="ctr"/>
+          <a:lstStyle/>
+          <a:p>
+            <a:pPr algn="ctr"/>
+            <a:endParaRPr lang="es-CL"/>
+          </a:p>
+        </p:txBody>
+      </p:sp>
+      <p:sp>
+        <p:nvSpPr>
+          <p:cNvPr id="70" name="Rectángulo 69">
+            <a:extLst>
+              <a:ext uri="{FF2B5EF4-FFF2-40B4-BE49-F238E27FC236}">
+                <a16:creationId xmlns:a16="http://schemas.microsoft.com/office/drawing/2014/main" id="{0F0BB7C7-D650-4379-A396-3D9B4B2E6E0B}"/>
+              </a:ext>
+            </a:extLst>
+          </p:cNvPr>
+          <p:cNvSpPr/>
+          <p:nvPr/>
+        </p:nvSpPr>
+        <p:spPr>
+          <a:xfrm>
+            <a:off x="5947062" y="4477615"/>
+            <a:ext cx="3158835" cy="322986"/>
+          </a:xfrm>
+          <a:prstGeom prst="rect">
+            <a:avLst/>
+          </a:prstGeom>
+          <a:solidFill>
+            <a:srgbClr val="474650">
+              <a:alpha val="70000"/>
+            </a:srgbClr>
+          </a:solidFill>
+          <a:ln>
+            <a:noFill/>
+          </a:ln>
+          <a:effectLst>
+            <a:outerShdw blurRad="50800" dist="38100" dir="5400000" algn="t" rotWithShape="0">
+              <a:prstClr val="black">
+                <a:alpha val="40000"/>
+              </a:prstClr>
+            </a:outerShdw>
+          </a:effectLst>
+        </p:spPr>
+        <p:style>
+          <a:lnRef idx="2">
+            <a:schemeClr val="accent1">
+              <a:shade val="50000"/>
+            </a:schemeClr>
+          </a:lnRef>
+          <a:fillRef idx="1">
+            <a:schemeClr val="accent1"/>
+          </a:fillRef>
+          <a:effectRef idx="0">
+            <a:schemeClr val="accent1"/>
+          </a:effectRef>
+          <a:fontRef idx="minor">
+            <a:schemeClr val="lt1"/>
+          </a:fontRef>
+        </p:style>
+        <p:txBody>
+          <a:bodyPr rtlCol="0" anchor="ctr"/>
+          <a:lstStyle/>
+          <a:p>
+            <a:pPr algn="ctr"/>
+            <a:endParaRPr lang="es-CL"/>
+          </a:p>
+        </p:txBody>
+      </p:sp>
     </p:spTree>
     <p:extLst>
       <p:ext uri="{BB962C8B-B14F-4D97-AF65-F5344CB8AC3E}">

</xml_diff>

<commit_message>
Correción de detalles esteticos como inclusión de iconos, cambios en tipografias y redistribución de graficos y controles.
</commit_message>
<xml_diff>
--- a/serie-naruto-shippuden/plantilla.pptx
+++ b/serie-naruto-shippuden/plantilla.pptx
@@ -261,7 +261,7 @@
           <a:p>
             <a:fld id="{8F9B85BA-CB58-4850-9C01-B97638B0E33F}" type="datetimeFigureOut">
               <a:rPr lang="es-CL" smtClean="0"/>
-              <a:t>24-06-2025</a:t>
+              <a:t>25-06-2025</a:t>
             </a:fld>
             <a:endParaRPr lang="es-CL"/>
           </a:p>
@@ -461,7 +461,7 @@
           <a:p>
             <a:fld id="{8F9B85BA-CB58-4850-9C01-B97638B0E33F}" type="datetimeFigureOut">
               <a:rPr lang="es-CL" smtClean="0"/>
-              <a:t>24-06-2025</a:t>
+              <a:t>25-06-2025</a:t>
             </a:fld>
             <a:endParaRPr lang="es-CL"/>
           </a:p>
@@ -671,7 +671,7 @@
           <a:p>
             <a:fld id="{8F9B85BA-CB58-4850-9C01-B97638B0E33F}" type="datetimeFigureOut">
               <a:rPr lang="es-CL" smtClean="0"/>
-              <a:t>24-06-2025</a:t>
+              <a:t>25-06-2025</a:t>
             </a:fld>
             <a:endParaRPr lang="es-CL"/>
           </a:p>
@@ -871,7 +871,7 @@
           <a:p>
             <a:fld id="{8F9B85BA-CB58-4850-9C01-B97638B0E33F}" type="datetimeFigureOut">
               <a:rPr lang="es-CL" smtClean="0"/>
-              <a:t>24-06-2025</a:t>
+              <a:t>25-06-2025</a:t>
             </a:fld>
             <a:endParaRPr lang="es-CL"/>
           </a:p>
@@ -1147,7 +1147,7 @@
           <a:p>
             <a:fld id="{8F9B85BA-CB58-4850-9C01-B97638B0E33F}" type="datetimeFigureOut">
               <a:rPr lang="es-CL" smtClean="0"/>
-              <a:t>24-06-2025</a:t>
+              <a:t>25-06-2025</a:t>
             </a:fld>
             <a:endParaRPr lang="es-CL"/>
           </a:p>
@@ -1415,7 +1415,7 @@
           <a:p>
             <a:fld id="{8F9B85BA-CB58-4850-9C01-B97638B0E33F}" type="datetimeFigureOut">
               <a:rPr lang="es-CL" smtClean="0"/>
-              <a:t>24-06-2025</a:t>
+              <a:t>25-06-2025</a:t>
             </a:fld>
             <a:endParaRPr lang="es-CL"/>
           </a:p>
@@ -1830,7 +1830,7 @@
           <a:p>
             <a:fld id="{8F9B85BA-CB58-4850-9C01-B97638B0E33F}" type="datetimeFigureOut">
               <a:rPr lang="es-CL" smtClean="0"/>
-              <a:t>24-06-2025</a:t>
+              <a:t>25-06-2025</a:t>
             </a:fld>
             <a:endParaRPr lang="es-CL"/>
           </a:p>
@@ -1972,7 +1972,7 @@
           <a:p>
             <a:fld id="{8F9B85BA-CB58-4850-9C01-B97638B0E33F}" type="datetimeFigureOut">
               <a:rPr lang="es-CL" smtClean="0"/>
-              <a:t>24-06-2025</a:t>
+              <a:t>25-06-2025</a:t>
             </a:fld>
             <a:endParaRPr lang="es-CL"/>
           </a:p>
@@ -2085,7 +2085,7 @@
           <a:p>
             <a:fld id="{8F9B85BA-CB58-4850-9C01-B97638B0E33F}" type="datetimeFigureOut">
               <a:rPr lang="es-CL" smtClean="0"/>
-              <a:t>24-06-2025</a:t>
+              <a:t>25-06-2025</a:t>
             </a:fld>
             <a:endParaRPr lang="es-CL"/>
           </a:p>
@@ -2398,7 +2398,7 @@
           <a:p>
             <a:fld id="{8F9B85BA-CB58-4850-9C01-B97638B0E33F}" type="datetimeFigureOut">
               <a:rPr lang="es-CL" smtClean="0"/>
-              <a:t>24-06-2025</a:t>
+              <a:t>25-06-2025</a:t>
             </a:fld>
             <a:endParaRPr lang="es-CL"/>
           </a:p>
@@ -2687,7 +2687,7 @@
           <a:p>
             <a:fld id="{8F9B85BA-CB58-4850-9C01-B97638B0E33F}" type="datetimeFigureOut">
               <a:rPr lang="es-CL" smtClean="0"/>
-              <a:t>24-06-2025</a:t>
+              <a:t>25-06-2025</a:t>
             </a:fld>
             <a:endParaRPr lang="es-CL"/>
           </a:p>
@@ -2930,7 +2930,7 @@
           <a:p>
             <a:fld id="{8F9B85BA-CB58-4850-9C01-B97638B0E33F}" type="datetimeFigureOut">
               <a:rPr lang="es-CL" smtClean="0"/>
-              <a:t>24-06-2025</a:t>
+              <a:t>25-06-2025</a:t>
             </a:fld>
             <a:endParaRPr lang="es-CL"/>
           </a:p>
@@ -3369,7 +3369,7 @@
         </p:nvSpPr>
         <p:spPr>
           <a:xfrm>
-            <a:off x="8675255" y="749299"/>
+            <a:off x="9328219" y="697671"/>
             <a:ext cx="2552918" cy="591127"/>
           </a:xfrm>
           <a:prstGeom prst="rect">
@@ -3490,7 +3490,7 @@
         </p:nvSpPr>
         <p:spPr>
           <a:xfrm>
-            <a:off x="2520369" y="2220190"/>
+            <a:off x="2520369" y="2168562"/>
             <a:ext cx="4054766" cy="2107336"/>
           </a:xfrm>
           <a:prstGeom prst="rect">
@@ -3551,7 +3551,7 @@
         </p:nvSpPr>
         <p:spPr>
           <a:xfrm>
-            <a:off x="931720" y="2220189"/>
+            <a:off x="931720" y="2168561"/>
             <a:ext cx="1440868" cy="2107337"/>
           </a:xfrm>
           <a:prstGeom prst="rect">
@@ -3610,7 +3610,7 @@
         </p:nvSpPr>
         <p:spPr>
           <a:xfrm>
-            <a:off x="6722916" y="2220190"/>
+            <a:off x="6722916" y="2168562"/>
             <a:ext cx="2382983" cy="2107336"/>
           </a:xfrm>
           <a:prstGeom prst="rect">
@@ -3671,7 +3671,7 @@
         </p:nvSpPr>
         <p:spPr>
           <a:xfrm>
-            <a:off x="931720" y="1541313"/>
+            <a:off x="931720" y="1489685"/>
             <a:ext cx="886689" cy="553029"/>
           </a:xfrm>
           <a:prstGeom prst="rect">
@@ -3732,7 +3732,7 @@
         </p:nvSpPr>
         <p:spPr>
           <a:xfrm>
-            <a:off x="1909613" y="1541313"/>
+            <a:off x="1909613" y="1489685"/>
             <a:ext cx="1394692" cy="553029"/>
           </a:xfrm>
           <a:prstGeom prst="rect">
@@ -3793,7 +3793,7 @@
         </p:nvSpPr>
         <p:spPr>
           <a:xfrm>
-            <a:off x="3366065" y="1541313"/>
+            <a:off x="3366065" y="1489685"/>
             <a:ext cx="997528" cy="553029"/>
           </a:xfrm>
           <a:prstGeom prst="rect">
@@ -3842,10 +3842,10 @@
       </p:sp>
       <p:sp>
         <p:nvSpPr>
-          <p:cNvPr id="23" name="Rectángulo 22">
-            <a:extLst>
-              <a:ext uri="{FF2B5EF4-FFF2-40B4-BE49-F238E27FC236}">
-                <a16:creationId xmlns:a16="http://schemas.microsoft.com/office/drawing/2014/main" id="{01E68EE3-8AD3-4ED8-9A99-173AAFCE0F2C}"/>
+          <p:cNvPr id="30" name="Rectángulo 29">
+            <a:extLst>
+              <a:ext uri="{FF2B5EF4-FFF2-40B4-BE49-F238E27FC236}">
+                <a16:creationId xmlns:a16="http://schemas.microsoft.com/office/drawing/2014/main" id="{50CE7AF2-A890-422F-8D05-F016381CDA47}"/>
               </a:ext>
             </a:extLst>
           </p:cNvPr>
@@ -3854,8 +3854,8 @@
         </p:nvSpPr>
         <p:spPr>
           <a:xfrm>
-            <a:off x="4425353" y="1541313"/>
-            <a:ext cx="997528" cy="553029"/>
+            <a:off x="9253680" y="2168562"/>
+            <a:ext cx="2627458" cy="4488586"/>
           </a:xfrm>
           <a:prstGeom prst="rect">
             <a:avLst/>
@@ -3903,10 +3903,10 @@
       </p:sp>
       <p:sp>
         <p:nvSpPr>
-          <p:cNvPr id="30" name="Rectángulo 29">
-            <a:extLst>
-              <a:ext uri="{FF2B5EF4-FFF2-40B4-BE49-F238E27FC236}">
-                <a16:creationId xmlns:a16="http://schemas.microsoft.com/office/drawing/2014/main" id="{50CE7AF2-A890-422F-8D05-F016381CDA47}"/>
+          <p:cNvPr id="34" name="Rectángulo 33">
+            <a:extLst>
+              <a:ext uri="{FF2B5EF4-FFF2-40B4-BE49-F238E27FC236}">
+                <a16:creationId xmlns:a16="http://schemas.microsoft.com/office/drawing/2014/main" id="{D761F7D6-5851-4F9E-9138-C841BD2D00DE}"/>
               </a:ext>
             </a:extLst>
           </p:cNvPr>
@@ -3915,8 +3915,8 @@
         </p:nvSpPr>
         <p:spPr>
           <a:xfrm>
-            <a:off x="9253680" y="2220190"/>
-            <a:ext cx="2627458" cy="4488586"/>
+            <a:off x="931720" y="4425987"/>
+            <a:ext cx="4867562" cy="2231161"/>
           </a:xfrm>
           <a:prstGeom prst="rect">
             <a:avLst/>
@@ -3964,10 +3964,10 @@
       </p:sp>
       <p:sp>
         <p:nvSpPr>
-          <p:cNvPr id="34" name="Rectángulo 33">
-            <a:extLst>
-              <a:ext uri="{FF2B5EF4-FFF2-40B4-BE49-F238E27FC236}">
-                <a16:creationId xmlns:a16="http://schemas.microsoft.com/office/drawing/2014/main" id="{D761F7D6-5851-4F9E-9138-C841BD2D00DE}"/>
+          <p:cNvPr id="36" name="Rectángulo 35">
+            <a:extLst>
+              <a:ext uri="{FF2B5EF4-FFF2-40B4-BE49-F238E27FC236}">
+                <a16:creationId xmlns:a16="http://schemas.microsoft.com/office/drawing/2014/main" id="{F373AE56-1EA2-42CC-9B7F-F072CC4C649E}"/>
               </a:ext>
             </a:extLst>
           </p:cNvPr>
@@ -3976,8 +3976,8 @@
         </p:nvSpPr>
         <p:spPr>
           <a:xfrm>
-            <a:off x="931720" y="4477615"/>
-            <a:ext cx="4867562" cy="2231161"/>
+            <a:off x="5947063" y="4425987"/>
+            <a:ext cx="3158836" cy="2231161"/>
           </a:xfrm>
           <a:prstGeom prst="rect">
             <a:avLst/>
@@ -4025,10 +4025,10 @@
       </p:sp>
       <p:sp>
         <p:nvSpPr>
-          <p:cNvPr id="36" name="Rectángulo 35">
-            <a:extLst>
-              <a:ext uri="{FF2B5EF4-FFF2-40B4-BE49-F238E27FC236}">
-                <a16:creationId xmlns:a16="http://schemas.microsoft.com/office/drawing/2014/main" id="{F373AE56-1EA2-42CC-9B7F-F072CC4C649E}"/>
+          <p:cNvPr id="40" name="Rectángulo 39">
+            <a:extLst>
+              <a:ext uri="{FF2B5EF4-FFF2-40B4-BE49-F238E27FC236}">
+                <a16:creationId xmlns:a16="http://schemas.microsoft.com/office/drawing/2014/main" id="{15241EAA-A01E-497D-B748-75516DABB9B2}"/>
               </a:ext>
             </a:extLst>
           </p:cNvPr>
@@ -4037,69 +4037,8 @@
         </p:nvSpPr>
         <p:spPr>
           <a:xfrm>
-            <a:off x="5947063" y="4477615"/>
-            <a:ext cx="3158836" cy="2231161"/>
-          </a:xfrm>
-          <a:prstGeom prst="rect">
-            <a:avLst/>
-          </a:prstGeom>
-          <a:solidFill>
-            <a:srgbClr val="474650">
-              <a:alpha val="70000"/>
-            </a:srgbClr>
-          </a:solidFill>
-          <a:ln>
-            <a:noFill/>
-          </a:ln>
-          <a:effectLst>
-            <a:outerShdw blurRad="63500" sx="102000" sy="102000" algn="ctr" rotWithShape="0">
-              <a:prstClr val="black">
-                <a:alpha val="40000"/>
-              </a:prstClr>
-            </a:outerShdw>
-          </a:effectLst>
-        </p:spPr>
-        <p:style>
-          <a:lnRef idx="2">
-            <a:schemeClr val="accent1">
-              <a:shade val="50000"/>
-            </a:schemeClr>
-          </a:lnRef>
-          <a:fillRef idx="1">
-            <a:schemeClr val="accent1"/>
-          </a:fillRef>
-          <a:effectRef idx="0">
-            <a:schemeClr val="accent1"/>
-          </a:effectRef>
-          <a:fontRef idx="minor">
-            <a:schemeClr val="lt1"/>
-          </a:fontRef>
-        </p:style>
-        <p:txBody>
-          <a:bodyPr rtlCol="0" anchor="ctr"/>
-          <a:lstStyle/>
-          <a:p>
-            <a:pPr algn="ctr"/>
-            <a:endParaRPr lang="es-CL"/>
-          </a:p>
-        </p:txBody>
-      </p:sp>
-      <p:sp>
-        <p:nvSpPr>
-          <p:cNvPr id="40" name="Rectángulo 39">
-            <a:extLst>
-              <a:ext uri="{FF2B5EF4-FFF2-40B4-BE49-F238E27FC236}">
-                <a16:creationId xmlns:a16="http://schemas.microsoft.com/office/drawing/2014/main" id="{15241EAA-A01E-497D-B748-75516DABB9B2}"/>
-              </a:ext>
-            </a:extLst>
-          </p:cNvPr>
-          <p:cNvSpPr/>
-          <p:nvPr/>
-        </p:nvSpPr>
-        <p:spPr>
-          <a:xfrm>
-            <a:off x="931720" y="749299"/>
-            <a:ext cx="5015344" cy="591127"/>
+            <a:off x="931719" y="697671"/>
+            <a:ext cx="5791195" cy="591127"/>
           </a:xfrm>
           <a:prstGeom prst="rect">
             <a:avLst/>
@@ -4160,7 +4099,7 @@
         </p:nvSpPr>
         <p:spPr>
           <a:xfrm>
-            <a:off x="931721" y="749299"/>
+            <a:off x="931721" y="697671"/>
             <a:ext cx="397161" cy="591127"/>
           </a:xfrm>
           <a:prstGeom prst="rect">
@@ -4213,7 +4152,7 @@
         </p:nvSpPr>
         <p:spPr>
           <a:xfrm>
-            <a:off x="6164119" y="749299"/>
+            <a:off x="6817083" y="697671"/>
             <a:ext cx="2294081" cy="591127"/>
           </a:xfrm>
           <a:prstGeom prst="rect">
@@ -4275,7 +4214,7 @@
         </p:nvSpPr>
         <p:spPr>
           <a:xfrm>
-            <a:off x="6164121" y="749299"/>
+            <a:off x="6817085" y="697671"/>
             <a:ext cx="397161" cy="591127"/>
           </a:xfrm>
           <a:prstGeom prst="rect">
@@ -4328,7 +4267,7 @@
         </p:nvSpPr>
         <p:spPr>
           <a:xfrm>
-            <a:off x="8638131" y="749299"/>
+            <a:off x="9291095" y="697671"/>
             <a:ext cx="397161" cy="591127"/>
           </a:xfrm>
           <a:prstGeom prst="rect">
@@ -4395,7 +4334,7 @@
         </p:blipFill>
         <p:spPr>
           <a:xfrm>
-            <a:off x="963827" y="867097"/>
+            <a:off x="963827" y="815469"/>
             <a:ext cx="322911" cy="322911"/>
           </a:xfrm>
           <a:prstGeom prst="rect">
@@ -4430,7 +4369,7 @@
         </p:blipFill>
         <p:spPr>
           <a:xfrm>
-            <a:off x="8675255" y="867096"/>
+            <a:off x="9328219" y="815468"/>
             <a:ext cx="322911" cy="322911"/>
           </a:xfrm>
           <a:prstGeom prst="rect">
@@ -4465,7 +4404,7 @@
         </p:blipFill>
         <p:spPr>
           <a:xfrm>
-            <a:off x="6201245" y="864458"/>
+            <a:off x="6854209" y="812830"/>
             <a:ext cx="322911" cy="322911"/>
           </a:xfrm>
           <a:prstGeom prst="rect">
@@ -4487,7 +4426,7 @@
         </p:nvSpPr>
         <p:spPr>
           <a:xfrm>
-            <a:off x="9253678" y="2220189"/>
+            <a:off x="9253678" y="2168561"/>
             <a:ext cx="2627459" cy="322986"/>
           </a:xfrm>
           <a:prstGeom prst="rect">
@@ -4548,7 +4487,7 @@
         </p:nvSpPr>
         <p:spPr>
           <a:xfrm>
-            <a:off x="6722915" y="2220189"/>
+            <a:off x="6722915" y="2168561"/>
             <a:ext cx="2382984" cy="322986"/>
           </a:xfrm>
           <a:prstGeom prst="rect">
@@ -4609,7 +4548,7 @@
         </p:nvSpPr>
         <p:spPr>
           <a:xfrm>
-            <a:off x="5947062" y="4477615"/>
+            <a:off x="5947062" y="4425987"/>
             <a:ext cx="3158835" cy="322986"/>
           </a:xfrm>
           <a:prstGeom prst="rect">
@@ -4656,6 +4595,378 @@
           </a:p>
         </p:txBody>
       </p:sp>
+      <p:pic>
+        <p:nvPicPr>
+          <p:cNvPr id="3" name="Imagen 2">
+            <a:extLst>
+              <a:ext uri="{FF2B5EF4-FFF2-40B4-BE49-F238E27FC236}">
+                <a16:creationId xmlns:a16="http://schemas.microsoft.com/office/drawing/2014/main" id="{37EF4B1E-AE30-4289-90BA-4B7A5764A91C}"/>
+              </a:ext>
+            </a:extLst>
+          </p:cNvPr>
+          <p:cNvPicPr>
+            <a:picLocks noChangeAspect="1"/>
+          </p:cNvPicPr>
+          <p:nvPr/>
+        </p:nvPicPr>
+        <p:blipFill>
+          <a:blip r:embed="rId5">
+            <a:extLst>
+              <a:ext uri="{28A0092B-C50C-407E-A947-70E740481C1C}">
+                <a14:useLocalDpi xmlns:a14="http://schemas.microsoft.com/office/drawing/2010/main" val="0"/>
+              </a:ext>
+            </a:extLst>
+          </a:blip>
+          <a:stretch>
+            <a:fillRect/>
+          </a:stretch>
+        </p:blipFill>
+        <p:spPr>
+          <a:xfrm rot="16200000">
+            <a:off x="931719" y="200852"/>
+            <a:ext cx="347560" cy="347560"/>
+          </a:xfrm>
+          <a:prstGeom prst="rect">
+            <a:avLst/>
+          </a:prstGeom>
+        </p:spPr>
+      </p:pic>
+      <p:sp>
+        <p:nvSpPr>
+          <p:cNvPr id="4" name="CuadroTexto 3">
+            <a:extLst>
+              <a:ext uri="{FF2B5EF4-FFF2-40B4-BE49-F238E27FC236}">
+                <a16:creationId xmlns:a16="http://schemas.microsoft.com/office/drawing/2014/main" id="{D0014CA0-2ECF-401B-BB85-E18D59D3A7AA}"/>
+              </a:ext>
+            </a:extLst>
+          </p:cNvPr>
+          <p:cNvSpPr txBox="1"/>
+          <p:nvPr/>
+        </p:nvSpPr>
+        <p:spPr>
+          <a:xfrm>
+            <a:off x="1279279" y="190037"/>
+            <a:ext cx="3135538" cy="369332"/>
+          </a:xfrm>
+          <a:prstGeom prst="rect">
+            <a:avLst/>
+          </a:prstGeom>
+          <a:noFill/>
+        </p:spPr>
+        <p:txBody>
+          <a:bodyPr wrap="none" rtlCol="0">
+            <a:spAutoFit/>
+          </a:bodyPr>
+          <a:lstStyle/>
+          <a:p>
+            <a:r>
+              <a:rPr lang="es-CL" dirty="0">
+                <a:latin typeface="Maiandra GD" panose="020E0502030308020204" pitchFamily="34" charset="0"/>
+              </a:rPr>
+              <a:t>ANÁLISIS POR TEMPORADA</a:t>
+            </a:r>
+          </a:p>
+        </p:txBody>
+      </p:sp>
+      <p:sp>
+        <p:nvSpPr>
+          <p:cNvPr id="28" name="Rectángulo 27">
+            <a:extLst>
+              <a:ext uri="{FF2B5EF4-FFF2-40B4-BE49-F238E27FC236}">
+                <a16:creationId xmlns:a16="http://schemas.microsoft.com/office/drawing/2014/main" id="{046D5075-C02A-4605-89F6-487BB5BB65C9}"/>
+              </a:ext>
+            </a:extLst>
+          </p:cNvPr>
+          <p:cNvSpPr/>
+          <p:nvPr/>
+        </p:nvSpPr>
+        <p:spPr>
+          <a:xfrm>
+            <a:off x="4425353" y="1488100"/>
+            <a:ext cx="1394692" cy="553029"/>
+          </a:xfrm>
+          <a:prstGeom prst="rect">
+            <a:avLst/>
+          </a:prstGeom>
+          <a:solidFill>
+            <a:srgbClr val="474650">
+              <a:alpha val="70000"/>
+            </a:srgbClr>
+          </a:solidFill>
+          <a:ln>
+            <a:noFill/>
+          </a:ln>
+          <a:effectLst>
+            <a:outerShdw blurRad="63500" sx="102000" sy="102000" algn="ctr" rotWithShape="0">
+              <a:prstClr val="black">
+                <a:alpha val="40000"/>
+              </a:prstClr>
+            </a:outerShdw>
+          </a:effectLst>
+        </p:spPr>
+        <p:style>
+          <a:lnRef idx="2">
+            <a:schemeClr val="accent1">
+              <a:shade val="50000"/>
+            </a:schemeClr>
+          </a:lnRef>
+          <a:fillRef idx="1">
+            <a:schemeClr val="accent1"/>
+          </a:fillRef>
+          <a:effectRef idx="0">
+            <a:schemeClr val="accent1"/>
+          </a:effectRef>
+          <a:fontRef idx="minor">
+            <a:schemeClr val="lt1"/>
+          </a:fontRef>
+        </p:style>
+        <p:txBody>
+          <a:bodyPr rtlCol="0" anchor="ctr"/>
+          <a:lstStyle/>
+          <a:p>
+            <a:pPr algn="ctr"/>
+            <a:endParaRPr lang="es-CL"/>
+          </a:p>
+        </p:txBody>
+      </p:sp>
+      <p:pic>
+        <p:nvPicPr>
+          <p:cNvPr id="16" name="Imagen 15">
+            <a:extLst>
+              <a:ext uri="{FF2B5EF4-FFF2-40B4-BE49-F238E27FC236}">
+                <a16:creationId xmlns:a16="http://schemas.microsoft.com/office/drawing/2014/main" id="{099F34E4-BC9F-471C-B15C-E9E78AAA1F6D}"/>
+              </a:ext>
+            </a:extLst>
+          </p:cNvPr>
+          <p:cNvPicPr>
+            <a:picLocks noChangeAspect="1"/>
+          </p:cNvPicPr>
+          <p:nvPr/>
+        </p:nvPicPr>
+        <p:blipFill>
+          <a:blip r:embed="rId6">
+            <a:extLst>
+              <a:ext uri="{28A0092B-C50C-407E-A947-70E740481C1C}">
+                <a14:useLocalDpi xmlns:a14="http://schemas.microsoft.com/office/drawing/2010/main" val="0"/>
+              </a:ext>
+            </a:extLst>
+          </a:blip>
+          <a:stretch>
+            <a:fillRect/>
+          </a:stretch>
+        </p:blipFill>
+        <p:spPr>
+          <a:xfrm rot="16200000">
+            <a:off x="-210706" y="636438"/>
+            <a:ext cx="982334" cy="509585"/>
+          </a:xfrm>
+          <a:prstGeom prst="rect">
+            <a:avLst/>
+          </a:prstGeom>
+        </p:spPr>
+      </p:pic>
+      <p:pic>
+        <p:nvPicPr>
+          <p:cNvPr id="32" name="Imagen 31">
+            <a:extLst>
+              <a:ext uri="{FF2B5EF4-FFF2-40B4-BE49-F238E27FC236}">
+                <a16:creationId xmlns:a16="http://schemas.microsoft.com/office/drawing/2014/main" id="{22868488-AF8B-4AD7-BAB3-6F7F9392E691}"/>
+              </a:ext>
+            </a:extLst>
+          </p:cNvPr>
+          <p:cNvPicPr>
+            <a:picLocks noChangeAspect="1"/>
+          </p:cNvPicPr>
+          <p:nvPr/>
+        </p:nvPicPr>
+        <p:blipFill>
+          <a:blip r:embed="rId7">
+            <a:extLst>
+              <a:ext uri="{28A0092B-C50C-407E-A947-70E740481C1C}">
+                <a14:useLocalDpi xmlns:a14="http://schemas.microsoft.com/office/drawing/2010/main" val="0"/>
+              </a:ext>
+            </a:extLst>
+          </a:blip>
+          <a:stretch>
+            <a:fillRect/>
+          </a:stretch>
+        </p:blipFill>
+        <p:spPr>
+          <a:xfrm>
+            <a:off x="6630540" y="4525818"/>
+            <a:ext cx="154035" cy="154035"/>
+          </a:xfrm>
+          <a:prstGeom prst="rect">
+            <a:avLst/>
+          </a:prstGeom>
+        </p:spPr>
+      </p:pic>
+      <p:pic>
+        <p:nvPicPr>
+          <p:cNvPr id="33" name="Imagen 32">
+            <a:extLst>
+              <a:ext uri="{FF2B5EF4-FFF2-40B4-BE49-F238E27FC236}">
+                <a16:creationId xmlns:a16="http://schemas.microsoft.com/office/drawing/2014/main" id="{EB7E0DB5-5C75-49B3-849E-B04A7DAD2F45}"/>
+              </a:ext>
+            </a:extLst>
+          </p:cNvPr>
+          <p:cNvPicPr>
+            <a:picLocks noChangeAspect="1"/>
+          </p:cNvPicPr>
+          <p:nvPr/>
+        </p:nvPicPr>
+        <p:blipFill>
+          <a:blip r:embed="rId8">
+            <a:extLst>
+              <a:ext uri="{28A0092B-C50C-407E-A947-70E740481C1C}">
+                <a14:useLocalDpi xmlns:a14="http://schemas.microsoft.com/office/drawing/2010/main" val="0"/>
+              </a:ext>
+            </a:extLst>
+          </a:blip>
+          <a:srcRect/>
+          <a:stretch/>
+        </p:blipFill>
+        <p:spPr>
+          <a:xfrm>
+            <a:off x="9688255" y="2260494"/>
+            <a:ext cx="169200" cy="169200"/>
+          </a:xfrm>
+          <a:prstGeom prst="rect">
+            <a:avLst/>
+          </a:prstGeom>
+        </p:spPr>
+      </p:pic>
+      <p:sp>
+        <p:nvSpPr>
+          <p:cNvPr id="35" name="Rectángulo 34">
+            <a:extLst>
+              <a:ext uri="{FF2B5EF4-FFF2-40B4-BE49-F238E27FC236}">
+                <a16:creationId xmlns:a16="http://schemas.microsoft.com/office/drawing/2014/main" id="{36B2620A-D5D1-4337-B7D5-6E33A58C15F7}"/>
+              </a:ext>
+            </a:extLst>
+          </p:cNvPr>
+          <p:cNvSpPr/>
+          <p:nvPr/>
+        </p:nvSpPr>
+        <p:spPr>
+          <a:xfrm>
+            <a:off x="2535612" y="2168561"/>
+            <a:ext cx="4039521" cy="322986"/>
+          </a:xfrm>
+          <a:prstGeom prst="rect">
+            <a:avLst/>
+          </a:prstGeom>
+          <a:solidFill>
+            <a:srgbClr val="474650">
+              <a:alpha val="70000"/>
+            </a:srgbClr>
+          </a:solidFill>
+          <a:ln>
+            <a:noFill/>
+          </a:ln>
+          <a:effectLst>
+            <a:outerShdw blurRad="50800" dist="38100" dir="5400000" algn="t" rotWithShape="0">
+              <a:prstClr val="black">
+                <a:alpha val="40000"/>
+              </a:prstClr>
+            </a:outerShdw>
+          </a:effectLst>
+        </p:spPr>
+        <p:style>
+          <a:lnRef idx="2">
+            <a:schemeClr val="accent1">
+              <a:shade val="50000"/>
+            </a:schemeClr>
+          </a:lnRef>
+          <a:fillRef idx="1">
+            <a:schemeClr val="accent1"/>
+          </a:fillRef>
+          <a:effectRef idx="0">
+            <a:schemeClr val="accent1"/>
+          </a:effectRef>
+          <a:fontRef idx="minor">
+            <a:schemeClr val="lt1"/>
+          </a:fontRef>
+        </p:style>
+        <p:txBody>
+          <a:bodyPr rtlCol="0" anchor="ctr"/>
+          <a:lstStyle/>
+          <a:p>
+            <a:pPr algn="ctr"/>
+            <a:endParaRPr lang="es-CL"/>
+          </a:p>
+        </p:txBody>
+      </p:sp>
+      <p:pic>
+        <p:nvPicPr>
+          <p:cNvPr id="37" name="Imagen 36">
+            <a:extLst>
+              <a:ext uri="{FF2B5EF4-FFF2-40B4-BE49-F238E27FC236}">
+                <a16:creationId xmlns:a16="http://schemas.microsoft.com/office/drawing/2014/main" id="{2C8AC020-217D-468B-AF5F-952ED0257AD5}"/>
+              </a:ext>
+            </a:extLst>
+          </p:cNvPr>
+          <p:cNvPicPr>
+            <a:picLocks noChangeAspect="1"/>
+          </p:cNvPicPr>
+          <p:nvPr/>
+        </p:nvPicPr>
+        <p:blipFill>
+          <a:blip r:embed="rId9">
+            <a:extLst>
+              <a:ext uri="{28A0092B-C50C-407E-A947-70E740481C1C}">
+                <a14:useLocalDpi xmlns:a14="http://schemas.microsoft.com/office/drawing/2010/main" val="0"/>
+              </a:ext>
+            </a:extLst>
+          </a:blip>
+          <a:srcRect/>
+          <a:stretch/>
+        </p:blipFill>
+        <p:spPr>
+          <a:xfrm>
+            <a:off x="2706885" y="2243601"/>
+            <a:ext cx="200555" cy="200555"/>
+          </a:xfrm>
+          <a:prstGeom prst="rect">
+            <a:avLst/>
+          </a:prstGeom>
+        </p:spPr>
+      </p:pic>
+      <p:pic>
+        <p:nvPicPr>
+          <p:cNvPr id="38" name="Imagen 37">
+            <a:extLst>
+              <a:ext uri="{FF2B5EF4-FFF2-40B4-BE49-F238E27FC236}">
+                <a16:creationId xmlns:a16="http://schemas.microsoft.com/office/drawing/2014/main" id="{4EE5C8FD-4B41-47FC-94B0-80B346EA0F4D}"/>
+              </a:ext>
+            </a:extLst>
+          </p:cNvPr>
+          <p:cNvPicPr>
+            <a:picLocks noChangeAspect="1"/>
+          </p:cNvPicPr>
+          <p:nvPr/>
+        </p:nvPicPr>
+        <p:blipFill>
+          <a:blip r:embed="rId10">
+            <a:extLst>
+              <a:ext uri="{28A0092B-C50C-407E-A947-70E740481C1C}">
+                <a14:useLocalDpi xmlns:a14="http://schemas.microsoft.com/office/drawing/2010/main" val="0"/>
+              </a:ext>
+            </a:extLst>
+          </a:blip>
+          <a:srcRect/>
+          <a:stretch/>
+        </p:blipFill>
+        <p:spPr>
+          <a:xfrm>
+            <a:off x="7241020" y="2253748"/>
+            <a:ext cx="200555" cy="200555"/>
+          </a:xfrm>
+          <a:prstGeom prst="rect">
+            <a:avLst/>
+          </a:prstGeom>
+        </p:spPr>
+      </p:pic>
     </p:spTree>
     <p:extLst>
       <p:ext uri="{BB962C8B-B14F-4D97-AF65-F5344CB8AC3E}">

</xml_diff>